<commit_message>
add 008 with point rotate
</commit_message>
<xml_diff>
--- a/Processing_创意编程.pptx
+++ b/Processing_创意编程.pptx
@@ -5,10 +5,10 @@
     <p:sldMasterId id="2147483744" r:id="rId4"/>
   </p:sldMasterIdLst>
   <p:notesMasterIdLst>
-    <p:notesMasterId r:id="rId14"/>
+    <p:notesMasterId r:id="rId17"/>
   </p:notesMasterIdLst>
   <p:handoutMasterIdLst>
-    <p:handoutMasterId r:id="rId15"/>
+    <p:handoutMasterId r:id="rId18"/>
   </p:handoutMasterIdLst>
   <p:sldIdLst>
     <p:sldId id="256" r:id="rId5"/>
@@ -19,7 +19,10 @@
     <p:sldId id="261" r:id="rId10"/>
     <p:sldId id="262" r:id="rId11"/>
     <p:sldId id="263" r:id="rId12"/>
-    <p:sldId id="264" r:id="rId13"/>
+    <p:sldId id="265" r:id="rId13"/>
+    <p:sldId id="266" r:id="rId14"/>
+    <p:sldId id="267" r:id="rId15"/>
+    <p:sldId id="264" r:id="rId16"/>
   </p:sldIdLst>
   <p:sldSz cx="12192000" cy="6858000"/>
   <p:notesSz cx="6858000" cy="9144000"/>
@@ -6842,6 +6845,1028 @@
 </p:sld>
 </file>
 
+<file path=ppt/slides/slide10.xml><?xml version="1.0" encoding="utf-8"?>
+<p:sld xmlns:a="http://schemas.openxmlformats.org/drawingml/2006/main" xmlns:r="http://schemas.openxmlformats.org/officeDocument/2006/relationships" xmlns:p="http://schemas.openxmlformats.org/presentationml/2006/main">
+  <p:cSld>
+    <p:spTree>
+      <p:nvGrpSpPr>
+        <p:cNvPr id="1" name=""/>
+        <p:cNvGrpSpPr/>
+        <p:nvPr/>
+      </p:nvGrpSpPr>
+      <p:grpSpPr>
+        <a:xfrm>
+          <a:off x="0" y="0"/>
+          <a:ext cx="0" cy="0"/>
+          <a:chOff x="0" y="0"/>
+          <a:chExt cx="0" cy="0"/>
+        </a:xfrm>
+      </p:grpSpPr>
+      <p:sp>
+        <p:nvSpPr>
+          <p:cNvPr id="6" name="Title 5">
+            <a:extLst>
+              <a:ext uri="{FF2B5EF4-FFF2-40B4-BE49-F238E27FC236}">
+                <a16:creationId xmlns:a16="http://schemas.microsoft.com/office/drawing/2014/main" id="{C0433D6F-7302-B92F-0DD7-B2EFDBC8DCB7}"/>
+              </a:ext>
+            </a:extLst>
+          </p:cNvPr>
+          <p:cNvSpPr>
+            <a:spLocks noGrp="1"/>
+          </p:cNvSpPr>
+          <p:nvPr>
+            <p:ph type="title"/>
+          </p:nvPr>
+        </p:nvSpPr>
+        <p:spPr/>
+        <p:txBody>
+          <a:bodyPr/>
+          <a:lstStyle/>
+          <a:p>
+            <a:r>
+              <a:rPr lang="zh-CN" altLang="en-US" dirty="0"/>
+              <a:t>补充知识：坐标系旋转公式</a:t>
+            </a:r>
+            <a:br>
+              <a:rPr lang="en-US" altLang="zh-CN" dirty="0"/>
+            </a:br>
+            <a:r>
+              <a:rPr lang="en-US" altLang="zh-CN" dirty="0"/>
+              <a:t>2)</a:t>
+            </a:r>
+            <a:r>
+              <a:rPr lang="zh-CN" altLang="en-US" dirty="0"/>
+              <a:t> </a:t>
+            </a:r>
+            <a:r>
+              <a:rPr lang="en-US" altLang="zh-CN" dirty="0"/>
+              <a:t>Sin(</a:t>
+            </a:r>
+            <a:r>
+              <a:rPr lang="en-US" altLang="zh-CN" dirty="0" err="1"/>
+              <a:t>a+b</a:t>
+            </a:r>
+            <a:r>
+              <a:rPr lang="en-US" altLang="zh-CN" dirty="0"/>
+              <a:t>) = cos(A)Cos(B) – Sin(A)Sin(B)</a:t>
+            </a:r>
+            <a:endParaRPr lang="en-US" dirty="0"/>
+          </a:p>
+        </p:txBody>
+      </p:sp>
+      <p:pic>
+        <p:nvPicPr>
+          <p:cNvPr id="3" name="Content Placeholder 2">
+            <a:extLst>
+              <a:ext uri="{FF2B5EF4-FFF2-40B4-BE49-F238E27FC236}">
+                <a16:creationId xmlns:a16="http://schemas.microsoft.com/office/drawing/2014/main" id="{50AF9353-AB81-595A-B14D-B1C7279C0AAD}"/>
+              </a:ext>
+            </a:extLst>
+          </p:cNvPr>
+          <p:cNvPicPr>
+            <a:picLocks noGrp="1" noChangeAspect="1"/>
+          </p:cNvPicPr>
+          <p:nvPr>
+            <p:ph sz="half" idx="1"/>
+          </p:nvPr>
+        </p:nvPicPr>
+        <p:blipFill>
+          <a:blip r:embed="rId2"/>
+          <a:stretch>
+            <a:fillRect/>
+          </a:stretch>
+        </p:blipFill>
+        <p:spPr>
+          <a:xfrm>
+            <a:off x="940204" y="2500287"/>
+            <a:ext cx="4211471" cy="2953014"/>
+          </a:xfrm>
+        </p:spPr>
+      </p:pic>
+      <p:sp>
+        <p:nvSpPr>
+          <p:cNvPr id="8" name="Content Placeholder 7">
+            <a:extLst>
+              <a:ext uri="{FF2B5EF4-FFF2-40B4-BE49-F238E27FC236}">
+                <a16:creationId xmlns:a16="http://schemas.microsoft.com/office/drawing/2014/main" id="{F3229864-1ECE-3539-6BA1-76E42C0591B3}"/>
+              </a:ext>
+            </a:extLst>
+          </p:cNvPr>
+          <p:cNvSpPr>
+            <a:spLocks noGrp="1"/>
+          </p:cNvSpPr>
+          <p:nvPr>
+            <p:ph sz="half" idx="2"/>
+          </p:nvPr>
+        </p:nvSpPr>
+        <p:spPr/>
+        <p:txBody>
+          <a:bodyPr/>
+          <a:lstStyle/>
+          <a:p>
+            <a:pPr marL="0" indent="0">
+              <a:buNone/>
+            </a:pPr>
+            <a:r>
+              <a:rPr lang="en-US" dirty="0"/>
+              <a:t>sin(</a:t>
+            </a:r>
+            <a:r>
+              <a:rPr lang="en-US" dirty="0" err="1"/>
+              <a:t>a+b</a:t>
+            </a:r>
+            <a:r>
+              <a:rPr lang="en-US" dirty="0"/>
+              <a:t>)</a:t>
+            </a:r>
+          </a:p>
+          <a:p>
+            <a:pPr marL="0" indent="0">
+              <a:buNone/>
+            </a:pPr>
+            <a:r>
+              <a:rPr lang="en-US" dirty="0"/>
+              <a:t>= PQ/OP</a:t>
+            </a:r>
+          </a:p>
+          <a:p>
+            <a:pPr marL="0" indent="0">
+              <a:buNone/>
+            </a:pPr>
+            <a:r>
+              <a:rPr lang="en-US" dirty="0"/>
+              <a:t>= (PT + TQ) / OP</a:t>
+            </a:r>
+          </a:p>
+          <a:p>
+            <a:pPr marL="0" indent="0">
+              <a:buNone/>
+            </a:pPr>
+            <a:r>
+              <a:rPr lang="en-US" dirty="0"/>
+              <a:t>= PT/OP + TQ/OP</a:t>
+            </a:r>
+          </a:p>
+          <a:p>
+            <a:pPr marL="0" indent="0">
+              <a:buNone/>
+            </a:pPr>
+            <a:r>
+              <a:rPr lang="en-US" dirty="0"/>
+              <a:t>= PT/OP + RS/OP</a:t>
+            </a:r>
+          </a:p>
+          <a:p>
+            <a:pPr marL="0" indent="0">
+              <a:buNone/>
+            </a:pPr>
+            <a:r>
+              <a:rPr lang="en-US" dirty="0"/>
+              <a:t>= PT/PR </a:t>
+            </a:r>
+            <a:r>
+              <a:rPr lang="en-US" dirty="0">
+                <a:sym typeface="Wingdings" panose="05000000000000000000" pitchFamily="2" charset="2"/>
+              </a:rPr>
+              <a:t> PR/OP + RS/OR  OR/OP</a:t>
+            </a:r>
+          </a:p>
+          <a:p>
+            <a:pPr marL="0" indent="0">
+              <a:buNone/>
+            </a:pPr>
+            <a:r>
+              <a:rPr lang="en-US" dirty="0">
+                <a:sym typeface="Wingdings" panose="05000000000000000000" pitchFamily="2" charset="2"/>
+              </a:rPr>
+              <a:t>= cos(a)  sin(b) + sin(a)  cos(b)</a:t>
+            </a:r>
+            <a:endParaRPr lang="en-US" dirty="0"/>
+          </a:p>
+        </p:txBody>
+      </p:sp>
+    </p:spTree>
+    <p:extLst>
+      <p:ext uri="{BB962C8B-B14F-4D97-AF65-F5344CB8AC3E}">
+        <p14:creationId xmlns:p14="http://schemas.microsoft.com/office/powerpoint/2010/main" val="1297516261"/>
+      </p:ext>
+    </p:extLst>
+  </p:cSld>
+  <p:clrMapOvr>
+    <a:masterClrMapping/>
+  </p:clrMapOvr>
+</p:sld>
+</file>
+
+<file path=ppt/slides/slide11.xml><?xml version="1.0" encoding="utf-8"?>
+<p:sld xmlns:a="http://schemas.openxmlformats.org/drawingml/2006/main" xmlns:r="http://schemas.openxmlformats.org/officeDocument/2006/relationships" xmlns:p="http://schemas.openxmlformats.org/presentationml/2006/main">
+  <p:cSld>
+    <p:spTree>
+      <p:nvGrpSpPr>
+        <p:cNvPr id="1" name=""/>
+        <p:cNvGrpSpPr/>
+        <p:nvPr/>
+      </p:nvGrpSpPr>
+      <p:grpSpPr>
+        <a:xfrm>
+          <a:off x="0" y="0"/>
+          <a:ext cx="0" cy="0"/>
+          <a:chOff x="0" y="0"/>
+          <a:chExt cx="0" cy="0"/>
+        </a:xfrm>
+      </p:grpSpPr>
+      <p:sp>
+        <p:nvSpPr>
+          <p:cNvPr id="2" name="Title 1">
+            <a:extLst>
+              <a:ext uri="{FF2B5EF4-FFF2-40B4-BE49-F238E27FC236}">
+                <a16:creationId xmlns:a16="http://schemas.microsoft.com/office/drawing/2014/main" id="{1C2D1CCF-6071-E2CA-4593-071078F4F0DF}"/>
+              </a:ext>
+            </a:extLst>
+          </p:cNvPr>
+          <p:cNvSpPr>
+            <a:spLocks noGrp="1"/>
+          </p:cNvSpPr>
+          <p:nvPr>
+            <p:ph type="title"/>
+          </p:nvPr>
+        </p:nvSpPr>
+        <p:spPr/>
+        <p:txBody>
+          <a:bodyPr/>
+          <a:lstStyle/>
+          <a:p>
+            <a:r>
+              <a:rPr lang="zh-CN" altLang="en-US" dirty="0"/>
+              <a:t>补充知识：坐标系旋转公式</a:t>
+            </a:r>
+            <a:br>
+              <a:rPr lang="en-US" altLang="zh-CN" dirty="0"/>
+            </a:br>
+            <a:r>
+              <a:rPr lang="zh-CN" altLang="en-US" dirty="0"/>
+              <a:t>圆弧上的旋转</a:t>
+            </a:r>
+            <a:endParaRPr lang="en-US" dirty="0"/>
+          </a:p>
+        </p:txBody>
+      </p:sp>
+      <p:pic>
+        <p:nvPicPr>
+          <p:cNvPr id="6" name="Content Placeholder 5">
+            <a:extLst>
+              <a:ext uri="{FF2B5EF4-FFF2-40B4-BE49-F238E27FC236}">
+                <a16:creationId xmlns:a16="http://schemas.microsoft.com/office/drawing/2014/main" id="{A26520B9-7F7C-E76F-ABF2-BA126FCB49FB}"/>
+              </a:ext>
+            </a:extLst>
+          </p:cNvPr>
+          <p:cNvPicPr>
+            <a:picLocks noGrp="1" noChangeAspect="1"/>
+          </p:cNvPicPr>
+          <p:nvPr>
+            <p:ph sz="half" idx="1"/>
+          </p:nvPr>
+        </p:nvPicPr>
+        <p:blipFill>
+          <a:blip r:embed="rId2"/>
+          <a:stretch>
+            <a:fillRect/>
+          </a:stretch>
+        </p:blipFill>
+        <p:spPr>
+          <a:xfrm>
+            <a:off x="685800" y="2394142"/>
+            <a:ext cx="4995863" cy="3144454"/>
+          </a:xfrm>
+        </p:spPr>
+      </p:pic>
+      <p:sp>
+        <p:nvSpPr>
+          <p:cNvPr id="4" name="Content Placeholder 3">
+            <a:extLst>
+              <a:ext uri="{FF2B5EF4-FFF2-40B4-BE49-F238E27FC236}">
+                <a16:creationId xmlns:a16="http://schemas.microsoft.com/office/drawing/2014/main" id="{2AD9D923-9983-4EA6-64D1-FFE2A903F617}"/>
+              </a:ext>
+            </a:extLst>
+          </p:cNvPr>
+          <p:cNvSpPr>
+            <a:spLocks noGrp="1"/>
+          </p:cNvSpPr>
+          <p:nvPr>
+            <p:ph sz="half" idx="2"/>
+          </p:nvPr>
+        </p:nvSpPr>
+        <p:spPr>
+          <a:xfrm>
+            <a:off x="5821894" y="2142067"/>
+            <a:ext cx="6262529" cy="3649133"/>
+          </a:xfrm>
+        </p:spPr>
+        <p:txBody>
+          <a:bodyPr/>
+          <a:lstStyle/>
+          <a:p>
+            <a:r>
+              <a:rPr lang="zh-CN" altLang="en-US" dirty="0"/>
+              <a:t>以圆心为原点，半径为 </a:t>
+            </a:r>
+            <a:r>
+              <a:rPr lang="en-US" altLang="zh-CN" dirty="0"/>
+              <a:t>r</a:t>
+            </a:r>
+          </a:p>
+          <a:p>
+            <a:r>
+              <a:rPr lang="en-US" altLang="zh-CN" dirty="0"/>
+              <a:t>P</a:t>
+            </a:r>
+            <a:r>
+              <a:rPr lang="zh-CN" altLang="en-US" dirty="0"/>
+              <a:t>点相对圆心坐标为</a:t>
+            </a:r>
+            <a:r>
+              <a:rPr lang="en-US" altLang="zh-CN" dirty="0"/>
+              <a:t> (</a:t>
+            </a:r>
+            <a:r>
+              <a:rPr lang="en-US" altLang="zh-CN" dirty="0" err="1"/>
+              <a:t>p.x-c.x</a:t>
+            </a:r>
+            <a:r>
+              <a:rPr lang="en-US" altLang="zh-CN" dirty="0"/>
+              <a:t>, </a:t>
+            </a:r>
+            <a:r>
+              <a:rPr lang="en-US" altLang="zh-CN" dirty="0" err="1"/>
+              <a:t>p.y-c.y</a:t>
+            </a:r>
+            <a:r>
+              <a:rPr lang="en-US" altLang="zh-CN" dirty="0"/>
+              <a:t>) = (dx, </a:t>
+            </a:r>
+            <a:r>
+              <a:rPr lang="en-US" altLang="zh-CN" dirty="0" err="1"/>
+              <a:t>dy</a:t>
+            </a:r>
+            <a:r>
+              <a:rPr lang="en-US" altLang="zh-CN" dirty="0"/>
+              <a:t>)</a:t>
+            </a:r>
+          </a:p>
+          <a:p>
+            <a:r>
+              <a:rPr lang="en-US" dirty="0"/>
+              <a:t>P’</a:t>
+            </a:r>
+            <a:r>
+              <a:rPr lang="zh-CN" altLang="en-US" dirty="0"/>
+              <a:t>点相对圆心坐标为</a:t>
+            </a:r>
+            <a:r>
+              <a:rPr lang="en-US" altLang="zh-CN" dirty="0"/>
+              <a:t> (p’.</a:t>
+            </a:r>
+            <a:r>
+              <a:rPr lang="en-US" altLang="zh-CN" dirty="0" err="1"/>
+              <a:t>x-c</a:t>
+            </a:r>
+            <a:r>
+              <a:rPr lang="en-US" altLang="zh-CN" dirty="0"/>
+              <a:t>.x, p’.</a:t>
+            </a:r>
+            <a:r>
+              <a:rPr lang="en-US" altLang="zh-CN" dirty="0" err="1"/>
+              <a:t>y-c</a:t>
+            </a:r>
+            <a:r>
+              <a:rPr lang="en-US" altLang="zh-CN" dirty="0"/>
+              <a:t>.y)</a:t>
+            </a:r>
+          </a:p>
+          <a:p>
+            <a:r>
+              <a:rPr lang="el-GR" altLang="zh-CN" dirty="0">
+                <a:cs typeface="Kokila" panose="020B0502040204020203" pitchFamily="34" charset="0"/>
+              </a:rPr>
+              <a:t>Θ</a:t>
+            </a:r>
+            <a:r>
+              <a:rPr lang="en-US" altLang="zh-CN" dirty="0">
+                <a:latin typeface="Latha" panose="020B0502040204020203" pitchFamily="34" charset="0"/>
+                <a:cs typeface="Latha" panose="020B0502040204020203" pitchFamily="34" charset="0"/>
+              </a:rPr>
+              <a:t> = a</a:t>
+            </a:r>
+          </a:p>
+          <a:p>
+            <a:r>
+              <a:rPr lang="en-US" dirty="0"/>
+              <a:t>p’. x-</a:t>
+            </a:r>
+            <a:r>
+              <a:rPr lang="en-US" dirty="0" err="1"/>
+              <a:t>c.x</a:t>
+            </a:r>
+            <a:r>
+              <a:rPr lang="en-US" dirty="0"/>
+              <a:t> = r </a:t>
+            </a:r>
+            <a:r>
+              <a:rPr lang="en-US" dirty="0">
+                <a:sym typeface="Wingdings" panose="05000000000000000000" pitchFamily="2" charset="2"/>
+              </a:rPr>
+              <a:t> cos(</a:t>
+            </a:r>
+            <a:r>
+              <a:rPr lang="en-US" dirty="0" err="1">
+                <a:sym typeface="Wingdings" panose="05000000000000000000" pitchFamily="2" charset="2"/>
+              </a:rPr>
+              <a:t>a+b</a:t>
+            </a:r>
+            <a:r>
+              <a:rPr lang="en-US" dirty="0">
+                <a:sym typeface="Wingdings" panose="05000000000000000000" pitchFamily="2" charset="2"/>
+              </a:rPr>
+              <a:t>) = r  cos(a)cos(b) – r  sin(a)sin(b)</a:t>
+            </a:r>
+            <a:br>
+              <a:rPr lang="en-US" dirty="0">
+                <a:sym typeface="Wingdings" panose="05000000000000000000" pitchFamily="2" charset="2"/>
+              </a:rPr>
+            </a:br>
+            <a:r>
+              <a:rPr lang="en-US" dirty="0">
+                <a:sym typeface="Wingdings" panose="05000000000000000000" pitchFamily="2" charset="2"/>
+              </a:rPr>
+              <a:t>= cos(a)  dx – sin(a)  </a:t>
+            </a:r>
+            <a:r>
+              <a:rPr lang="en-US" dirty="0" err="1">
+                <a:sym typeface="Wingdings" panose="05000000000000000000" pitchFamily="2" charset="2"/>
+              </a:rPr>
+              <a:t>dy</a:t>
+            </a:r>
+            <a:r>
+              <a:rPr lang="en-US" dirty="0">
+                <a:sym typeface="Wingdings" panose="05000000000000000000" pitchFamily="2" charset="2"/>
+              </a:rPr>
+              <a:t> = cos(</a:t>
+            </a:r>
+            <a:r>
+              <a:rPr lang="el-GR" altLang="zh-CN" dirty="0">
+                <a:cs typeface="Kokila" panose="020B0502040204020203" pitchFamily="34" charset="0"/>
+              </a:rPr>
+              <a:t>Θ</a:t>
+            </a:r>
+            <a:r>
+              <a:rPr lang="en-US" dirty="0">
+                <a:sym typeface="Wingdings" panose="05000000000000000000" pitchFamily="2" charset="2"/>
+              </a:rPr>
+              <a:t>)  dx – sin(</a:t>
+            </a:r>
+            <a:r>
+              <a:rPr lang="el-GR" altLang="zh-CN" dirty="0">
+                <a:cs typeface="Kokila" panose="020B0502040204020203" pitchFamily="34" charset="0"/>
+              </a:rPr>
+              <a:t>Θ</a:t>
+            </a:r>
+            <a:r>
+              <a:rPr lang="en-US" dirty="0">
+                <a:sym typeface="Wingdings" panose="05000000000000000000" pitchFamily="2" charset="2"/>
+              </a:rPr>
+              <a:t>)  </a:t>
+            </a:r>
+            <a:r>
+              <a:rPr lang="en-US" dirty="0" err="1">
+                <a:sym typeface="Wingdings" panose="05000000000000000000" pitchFamily="2" charset="2"/>
+              </a:rPr>
+              <a:t>dy</a:t>
+            </a:r>
+            <a:endParaRPr lang="en-US" dirty="0">
+              <a:sym typeface="Wingdings" panose="05000000000000000000" pitchFamily="2" charset="2"/>
+            </a:endParaRPr>
+          </a:p>
+          <a:p>
+            <a:r>
+              <a:rPr lang="en-US" dirty="0"/>
+              <a:t>p’. y-</a:t>
+            </a:r>
+            <a:r>
+              <a:rPr lang="en-US" dirty="0" err="1"/>
+              <a:t>c.y</a:t>
+            </a:r>
+            <a:r>
+              <a:rPr lang="en-US" dirty="0"/>
+              <a:t> = r </a:t>
+            </a:r>
+            <a:r>
+              <a:rPr lang="en-US" dirty="0">
+                <a:sym typeface="Wingdings" panose="05000000000000000000" pitchFamily="2" charset="2"/>
+              </a:rPr>
+              <a:t> sin(</a:t>
+            </a:r>
+            <a:r>
+              <a:rPr lang="en-US" dirty="0" err="1">
+                <a:sym typeface="Wingdings" panose="05000000000000000000" pitchFamily="2" charset="2"/>
+              </a:rPr>
+              <a:t>a+b</a:t>
+            </a:r>
+            <a:r>
+              <a:rPr lang="en-US" dirty="0">
+                <a:sym typeface="Wingdings" panose="05000000000000000000" pitchFamily="2" charset="2"/>
+              </a:rPr>
+              <a:t>) = r  sin(a)cos(b) + r  cos(a)sin(b)</a:t>
+            </a:r>
+            <a:br>
+              <a:rPr lang="en-US" dirty="0">
+                <a:sym typeface="Wingdings" panose="05000000000000000000" pitchFamily="2" charset="2"/>
+              </a:rPr>
+            </a:br>
+            <a:r>
+              <a:rPr lang="en-US" dirty="0">
+                <a:sym typeface="Wingdings" panose="05000000000000000000" pitchFamily="2" charset="2"/>
+              </a:rPr>
+              <a:t>= sin(a)  dx + cos(a)  </a:t>
+            </a:r>
+            <a:r>
+              <a:rPr lang="en-US" dirty="0" err="1">
+                <a:sym typeface="Wingdings" panose="05000000000000000000" pitchFamily="2" charset="2"/>
+              </a:rPr>
+              <a:t>dy</a:t>
+            </a:r>
+            <a:r>
+              <a:rPr lang="en-US" dirty="0">
+                <a:sym typeface="Wingdings" panose="05000000000000000000" pitchFamily="2" charset="2"/>
+              </a:rPr>
+              <a:t> = sin(</a:t>
+            </a:r>
+            <a:r>
+              <a:rPr lang="el-GR" altLang="zh-CN" dirty="0">
+                <a:cs typeface="Kokila" panose="020B0502040204020203" pitchFamily="34" charset="0"/>
+              </a:rPr>
+              <a:t>Θ</a:t>
+            </a:r>
+            <a:r>
+              <a:rPr lang="en-US" dirty="0">
+                <a:sym typeface="Wingdings" panose="05000000000000000000" pitchFamily="2" charset="2"/>
+              </a:rPr>
+              <a:t>)  dx + cos(</a:t>
+            </a:r>
+            <a:r>
+              <a:rPr lang="el-GR" altLang="zh-CN" dirty="0">
+                <a:cs typeface="Kokila" panose="020B0502040204020203" pitchFamily="34" charset="0"/>
+              </a:rPr>
+              <a:t>Θ</a:t>
+            </a:r>
+            <a:r>
+              <a:rPr lang="en-US" dirty="0">
+                <a:sym typeface="Wingdings" panose="05000000000000000000" pitchFamily="2" charset="2"/>
+              </a:rPr>
+              <a:t>)  </a:t>
+            </a:r>
+            <a:r>
+              <a:rPr lang="en-US" dirty="0" err="1">
+                <a:sym typeface="Wingdings" panose="05000000000000000000" pitchFamily="2" charset="2"/>
+              </a:rPr>
+              <a:t>dy</a:t>
+            </a:r>
+            <a:endParaRPr lang="en-US" dirty="0"/>
+          </a:p>
+        </p:txBody>
+      </p:sp>
+      <p:sp>
+        <p:nvSpPr>
+          <p:cNvPr id="7" name="TextBox 6">
+            <a:extLst>
+              <a:ext uri="{FF2B5EF4-FFF2-40B4-BE49-F238E27FC236}">
+                <a16:creationId xmlns:a16="http://schemas.microsoft.com/office/drawing/2014/main" id="{642E1A78-E9B6-1720-31CD-E459EE8E4654}"/>
+              </a:ext>
+            </a:extLst>
+          </p:cNvPr>
+          <p:cNvSpPr txBox="1"/>
+          <p:nvPr/>
+        </p:nvSpPr>
+        <p:spPr>
+          <a:xfrm>
+            <a:off x="3103610" y="3316941"/>
+            <a:ext cx="295274" cy="369332"/>
+          </a:xfrm>
+          <a:prstGeom prst="rect">
+            <a:avLst/>
+          </a:prstGeom>
+          <a:solidFill>
+            <a:srgbClr val="00B0F0"/>
+          </a:solidFill>
+        </p:spPr>
+        <p:txBody>
+          <a:bodyPr wrap="none" rtlCol="0">
+            <a:spAutoFit/>
+          </a:bodyPr>
+          <a:lstStyle/>
+          <a:p>
+            <a:r>
+              <a:rPr lang="en-US" dirty="0"/>
+              <a:t>a</a:t>
+            </a:r>
+          </a:p>
+        </p:txBody>
+      </p:sp>
+      <p:sp>
+        <p:nvSpPr>
+          <p:cNvPr id="8" name="TextBox 7">
+            <a:extLst>
+              <a:ext uri="{FF2B5EF4-FFF2-40B4-BE49-F238E27FC236}">
+                <a16:creationId xmlns:a16="http://schemas.microsoft.com/office/drawing/2014/main" id="{62C06754-B61E-C0E8-9649-4A67C1AAFC4C}"/>
+              </a:ext>
+            </a:extLst>
+          </p:cNvPr>
+          <p:cNvSpPr txBox="1"/>
+          <p:nvPr/>
+        </p:nvSpPr>
+        <p:spPr>
+          <a:xfrm>
+            <a:off x="2776118" y="4058436"/>
+            <a:ext cx="306494" cy="369332"/>
+          </a:xfrm>
+          <a:prstGeom prst="rect">
+            <a:avLst/>
+          </a:prstGeom>
+          <a:solidFill>
+            <a:srgbClr val="00B0F0"/>
+          </a:solidFill>
+        </p:spPr>
+        <p:txBody>
+          <a:bodyPr wrap="none" rtlCol="0">
+            <a:spAutoFit/>
+          </a:bodyPr>
+          <a:lstStyle/>
+          <a:p>
+            <a:r>
+              <a:rPr lang="en-US" dirty="0"/>
+              <a:t>b</a:t>
+            </a:r>
+          </a:p>
+        </p:txBody>
+      </p:sp>
+      <p:cxnSp>
+        <p:nvCxnSpPr>
+          <p:cNvPr id="10" name="Straight Connector 9">
+            <a:extLst>
+              <a:ext uri="{FF2B5EF4-FFF2-40B4-BE49-F238E27FC236}">
+                <a16:creationId xmlns:a16="http://schemas.microsoft.com/office/drawing/2014/main" id="{B7E675C2-9A14-082B-9F63-690444ED74F7}"/>
+              </a:ext>
+            </a:extLst>
+          </p:cNvPr>
+          <p:cNvCxnSpPr/>
+          <p:nvPr/>
+        </p:nvCxnSpPr>
+        <p:spPr>
+          <a:xfrm flipH="1">
+            <a:off x="2590800" y="2886635"/>
+            <a:ext cx="779929" cy="1389530"/>
+          </a:xfrm>
+          <a:prstGeom prst="line">
+            <a:avLst/>
+          </a:prstGeom>
+          <a:ln w="38100"/>
+        </p:spPr>
+        <p:style>
+          <a:lnRef idx="1">
+            <a:schemeClr val="accent1"/>
+          </a:lnRef>
+          <a:fillRef idx="0">
+            <a:schemeClr val="accent1"/>
+          </a:fillRef>
+          <a:effectRef idx="0">
+            <a:schemeClr val="accent1"/>
+          </a:effectRef>
+          <a:fontRef idx="minor">
+            <a:schemeClr val="tx1"/>
+          </a:fontRef>
+        </p:style>
+      </p:cxnSp>
+    </p:spTree>
+    <p:extLst>
+      <p:ext uri="{BB962C8B-B14F-4D97-AF65-F5344CB8AC3E}">
+        <p14:creationId xmlns:p14="http://schemas.microsoft.com/office/powerpoint/2010/main" val="2567597157"/>
+      </p:ext>
+    </p:extLst>
+  </p:cSld>
+  <p:clrMapOvr>
+    <a:masterClrMapping/>
+  </p:clrMapOvr>
+</p:sld>
+</file>
+
+<file path=ppt/slides/slide12.xml><?xml version="1.0" encoding="utf-8"?>
+<p:sld xmlns:a="http://schemas.openxmlformats.org/drawingml/2006/main" xmlns:r="http://schemas.openxmlformats.org/officeDocument/2006/relationships" xmlns:p="http://schemas.openxmlformats.org/presentationml/2006/main">
+  <p:cSld>
+    <p:spTree>
+      <p:nvGrpSpPr>
+        <p:cNvPr id="1" name=""/>
+        <p:cNvGrpSpPr/>
+        <p:nvPr/>
+      </p:nvGrpSpPr>
+      <p:grpSpPr>
+        <a:xfrm>
+          <a:off x="0" y="0"/>
+          <a:ext cx="0" cy="0"/>
+          <a:chOff x="0" y="0"/>
+          <a:chExt cx="0" cy="0"/>
+        </a:xfrm>
+      </p:grpSpPr>
+      <p:sp>
+        <p:nvSpPr>
+          <p:cNvPr id="5" name="Title 4">
+            <a:extLst>
+              <a:ext uri="{FF2B5EF4-FFF2-40B4-BE49-F238E27FC236}">
+                <a16:creationId xmlns:a16="http://schemas.microsoft.com/office/drawing/2014/main" id="{F658C86E-4204-9782-02DC-6BBD4E5ED57D}"/>
+              </a:ext>
+            </a:extLst>
+          </p:cNvPr>
+          <p:cNvSpPr>
+            <a:spLocks noGrp="1"/>
+          </p:cNvSpPr>
+          <p:nvPr>
+            <p:ph type="title"/>
+          </p:nvPr>
+        </p:nvSpPr>
+        <p:spPr>
+          <a:xfrm>
+            <a:off x="568031" y="3536903"/>
+            <a:ext cx="5196272" cy="1576276"/>
+          </a:xfrm>
+        </p:spPr>
+        <p:txBody>
+          <a:bodyPr vert="horz" lIns="91440" tIns="45720" rIns="91440" bIns="45720" rtlCol="0" anchor="b">
+            <a:normAutofit/>
+          </a:bodyPr>
+          <a:lstStyle/>
+          <a:p>
+            <a:r>
+              <a:rPr lang="en-US" sz="4400" dirty="0">
+                <a:solidFill>
+                  <a:srgbClr val="FFFFFF"/>
+                </a:solidFill>
+              </a:rPr>
+              <a:t>Processing </a:t>
+            </a:r>
+            <a:br>
+              <a:rPr lang="en-US" sz="4400" dirty="0">
+                <a:solidFill>
+                  <a:srgbClr val="FFFFFF"/>
+                </a:solidFill>
+              </a:rPr>
+            </a:br>
+            <a:r>
+              <a:rPr lang="zh-CN" altLang="en-US" sz="4400" dirty="0">
+                <a:solidFill>
+                  <a:srgbClr val="FFFFFF"/>
+                </a:solidFill>
+              </a:rPr>
+              <a:t>点 </a:t>
+            </a:r>
+            <a:r>
+              <a:rPr lang="en-US" altLang="zh-CN" sz="4400" dirty="0">
+                <a:solidFill>
+                  <a:srgbClr val="FFFFFF"/>
+                </a:solidFill>
+              </a:rPr>
+              <a:t>Point</a:t>
+            </a:r>
+            <a:endParaRPr lang="en-US" sz="4400" dirty="0">
+              <a:solidFill>
+                <a:srgbClr val="FFFFFF"/>
+              </a:solidFill>
+            </a:endParaRPr>
+          </a:p>
+        </p:txBody>
+      </p:sp>
+      <p:sp>
+        <p:nvSpPr>
+          <p:cNvPr id="6" name="Text Placeholder 5">
+            <a:extLst>
+              <a:ext uri="{FF2B5EF4-FFF2-40B4-BE49-F238E27FC236}">
+                <a16:creationId xmlns:a16="http://schemas.microsoft.com/office/drawing/2014/main" id="{0948C32B-C854-A931-D9ED-1A29A8A882CA}"/>
+              </a:ext>
+            </a:extLst>
+          </p:cNvPr>
+          <p:cNvSpPr>
+            <a:spLocks noGrp="1"/>
+          </p:cNvSpPr>
+          <p:nvPr>
+            <p:ph type="body" idx="1"/>
+          </p:nvPr>
+        </p:nvSpPr>
+        <p:spPr>
+          <a:xfrm>
+            <a:off x="29384" y="5805023"/>
+            <a:ext cx="6259035" cy="435206"/>
+          </a:xfrm>
+        </p:spPr>
+        <p:txBody>
+          <a:bodyPr vert="horz" lIns="91440" tIns="45720" rIns="91440" bIns="45720" rtlCol="0" anchor="t">
+            <a:normAutofit fontScale="92500" lnSpcReduction="20000"/>
+          </a:bodyPr>
+          <a:lstStyle/>
+          <a:p>
+            <a:pPr algn="r"/>
+            <a:r>
+              <a:rPr lang="en-US" sz="1800" b="1" dirty="0">
+                <a:hlinkClick r:id="rId2"/>
+              </a:rPr>
+              <a:t>https://github.com/yasenstar/Processing_Programming</a:t>
+            </a:r>
+            <a:endParaRPr lang="en-US" sz="1800" b="1" dirty="0">
+              <a:solidFill>
+                <a:srgbClr val="FFFFFF"/>
+              </a:solidFill>
+            </a:endParaRPr>
+          </a:p>
+          <a:p>
+            <a:pPr algn="r"/>
+            <a:endParaRPr lang="en-US" sz="1800" b="1" dirty="0"/>
+          </a:p>
+        </p:txBody>
+      </p:sp>
+      <p:pic>
+        <p:nvPicPr>
+          <p:cNvPr id="4" name="Picture 3">
+            <a:extLst>
+              <a:ext uri="{FF2B5EF4-FFF2-40B4-BE49-F238E27FC236}">
+                <a16:creationId xmlns:a16="http://schemas.microsoft.com/office/drawing/2014/main" id="{2BB64D50-2612-E1AB-3582-3EC0F25781DD}"/>
+              </a:ext>
+            </a:extLst>
+          </p:cNvPr>
+          <p:cNvPicPr>
+            <a:picLocks noChangeAspect="1"/>
+          </p:cNvPicPr>
+          <p:nvPr/>
+        </p:nvPicPr>
+        <p:blipFill>
+          <a:blip r:embed="rId3"/>
+          <a:stretch>
+            <a:fillRect/>
+          </a:stretch>
+        </p:blipFill>
+        <p:spPr>
+          <a:xfrm>
+            <a:off x="550343" y="302887"/>
+            <a:ext cx="2445296" cy="3054381"/>
+          </a:xfrm>
+          <a:prstGeom prst="rect">
+            <a:avLst/>
+          </a:prstGeom>
+          <a:solidFill>
+            <a:srgbClr val="FFFFFF">
+              <a:shade val="85000"/>
+            </a:srgbClr>
+          </a:solidFill>
+        </p:spPr>
+      </p:pic>
+      <p:sp>
+        <p:nvSpPr>
+          <p:cNvPr id="7" name="TextBox 6">
+            <a:extLst>
+              <a:ext uri="{FF2B5EF4-FFF2-40B4-BE49-F238E27FC236}">
+                <a16:creationId xmlns:a16="http://schemas.microsoft.com/office/drawing/2014/main" id="{EC30F526-AE41-E2C2-352A-037BA5C2D2A9}"/>
+              </a:ext>
+            </a:extLst>
+          </p:cNvPr>
+          <p:cNvSpPr txBox="1"/>
+          <p:nvPr/>
+        </p:nvSpPr>
+        <p:spPr>
+          <a:xfrm>
+            <a:off x="3029200" y="306246"/>
+            <a:ext cx="1742785" cy="1323439"/>
+          </a:xfrm>
+          <a:prstGeom prst="rect">
+            <a:avLst/>
+          </a:prstGeom>
+          <a:noFill/>
+        </p:spPr>
+        <p:txBody>
+          <a:bodyPr wrap="none" rtlCol="0">
+            <a:spAutoFit/>
+          </a:bodyPr>
+          <a:lstStyle/>
+          <a:p>
+            <a:pPr algn="ctr"/>
+            <a:r>
+              <a:rPr lang="en-US" sz="8000" dirty="0"/>
+              <a:t>009</a:t>
+            </a:r>
+          </a:p>
+        </p:txBody>
+      </p:sp>
+      <p:pic>
+        <p:nvPicPr>
+          <p:cNvPr id="3" name="Picture 2">
+            <a:extLst>
+              <a:ext uri="{FF2B5EF4-FFF2-40B4-BE49-F238E27FC236}">
+                <a16:creationId xmlns:a16="http://schemas.microsoft.com/office/drawing/2014/main" id="{F51AD2B4-29E3-7290-D683-AA319D5A6BD7}"/>
+              </a:ext>
+            </a:extLst>
+          </p:cNvPr>
+          <p:cNvPicPr>
+            <a:picLocks noChangeAspect="1"/>
+          </p:cNvPicPr>
+          <p:nvPr/>
+        </p:nvPicPr>
+        <p:blipFill>
+          <a:blip r:embed="rId4"/>
+          <a:stretch>
+            <a:fillRect/>
+          </a:stretch>
+        </p:blipFill>
+        <p:spPr>
+          <a:xfrm>
+            <a:off x="4063627" y="1528062"/>
+            <a:ext cx="7652403" cy="3801875"/>
+          </a:xfrm>
+          <a:prstGeom prst="rect">
+            <a:avLst/>
+          </a:prstGeom>
+          <a:ln>
+            <a:noFill/>
+          </a:ln>
+          <a:effectLst>
+            <a:outerShdw blurRad="292100" dist="139700" dir="2700000" algn="tl" rotWithShape="0">
+              <a:srgbClr val="333333">
+                <a:alpha val="65000"/>
+              </a:srgbClr>
+            </a:outerShdw>
+          </a:effectLst>
+        </p:spPr>
+      </p:pic>
+      <p:sp>
+        <p:nvSpPr>
+          <p:cNvPr id="8" name="Rectangle: Rounded Corners 7">
+            <a:extLst>
+              <a:ext uri="{FF2B5EF4-FFF2-40B4-BE49-F238E27FC236}">
+                <a16:creationId xmlns:a16="http://schemas.microsoft.com/office/drawing/2014/main" id="{2C0EB603-92E7-8307-088A-9CF94AE03B89}"/>
+              </a:ext>
+            </a:extLst>
+          </p:cNvPr>
+          <p:cNvSpPr/>
+          <p:nvPr/>
+        </p:nvSpPr>
+        <p:spPr>
+          <a:xfrm>
+            <a:off x="6536554" y="4463143"/>
+            <a:ext cx="5109877" cy="650036"/>
+          </a:xfrm>
+          <a:prstGeom prst="roundRect">
+            <a:avLst>
+              <a:gd name="adj" fmla="val 6410"/>
+            </a:avLst>
+          </a:prstGeom>
+          <a:noFill/>
+          <a:ln w="57150">
+            <a:solidFill>
+              <a:schemeClr val="accent1"/>
+            </a:solidFill>
+          </a:ln>
+        </p:spPr>
+        <p:style>
+          <a:lnRef idx="2">
+            <a:schemeClr val="accent1">
+              <a:shade val="15000"/>
+            </a:schemeClr>
+          </a:lnRef>
+          <a:fillRef idx="1">
+            <a:schemeClr val="accent1"/>
+          </a:fillRef>
+          <a:effectRef idx="0">
+            <a:schemeClr val="accent1"/>
+          </a:effectRef>
+          <a:fontRef idx="minor">
+            <a:schemeClr val="lt1"/>
+          </a:fontRef>
+        </p:style>
+        <p:txBody>
+          <a:bodyPr rtlCol="0" anchor="ctr"/>
+          <a:lstStyle/>
+          <a:p>
+            <a:pPr algn="ctr"/>
+            <a:endParaRPr lang="en-US"/>
+          </a:p>
+        </p:txBody>
+      </p:sp>
+    </p:spTree>
+    <p:extLst>
+      <p:ext uri="{BB962C8B-B14F-4D97-AF65-F5344CB8AC3E}">
+        <p14:creationId xmlns:p14="http://schemas.microsoft.com/office/powerpoint/2010/main" val="2718071313"/>
+      </p:ext>
+    </p:extLst>
+  </p:cSld>
+  <p:clrMapOvr>
+    <a:masterClrMapping/>
+  </p:clrMapOvr>
+</p:sld>
+</file>
+
 <file path=ppt/slides/slide2.xml><?xml version="1.0" encoding="utf-8"?>
 <p:sld xmlns:a="http://schemas.openxmlformats.org/drawingml/2006/main" xmlns:r="http://schemas.openxmlformats.org/officeDocument/2006/relationships" xmlns:p="http://schemas.openxmlformats.org/presentationml/2006/main">
   <p:cSld>
@@ -18098,10 +19123,10 @@
       </p:grpSpPr>
       <p:sp>
         <p:nvSpPr>
-          <p:cNvPr id="5" name="Title 4">
+          <p:cNvPr id="6" name="Title 5">
             <a:extLst>
               <a:ext uri="{FF2B5EF4-FFF2-40B4-BE49-F238E27FC236}">
-                <a16:creationId xmlns:a16="http://schemas.microsoft.com/office/drawing/2014/main" id="{F658C86E-4204-9782-02DC-6BBD4E5ED57D}"/>
+                <a16:creationId xmlns:a16="http://schemas.microsoft.com/office/drawing/2014/main" id="{C0433D6F-7302-B92F-0DD7-B2EFDBC8DCB7}"/>
               </a:ext>
             </a:extLst>
           </p:cNvPr>
@@ -18112,63 +19137,97 @@
             <p:ph type="title"/>
           </p:nvPr>
         </p:nvSpPr>
+        <p:spPr/>
+        <p:txBody>
+          <a:bodyPr/>
+          <a:lstStyle/>
+          <a:p>
+            <a:r>
+              <a:rPr lang="zh-CN" altLang="en-US" dirty="0"/>
+              <a:t>补充知识：坐标系旋转公式</a:t>
+            </a:r>
+            <a:br>
+              <a:rPr lang="en-US" altLang="zh-CN" dirty="0"/>
+            </a:br>
+            <a:r>
+              <a:rPr lang="en-US" altLang="zh-CN" dirty="0"/>
+              <a:t>1)</a:t>
+            </a:r>
+            <a:r>
+              <a:rPr lang="zh-CN" altLang="en-US" dirty="0"/>
+              <a:t> </a:t>
+            </a:r>
+            <a:r>
+              <a:rPr lang="en-US" altLang="zh-CN" dirty="0"/>
+              <a:t>cos(</a:t>
+            </a:r>
+            <a:r>
+              <a:rPr lang="en-US" altLang="zh-CN" dirty="0" err="1"/>
+              <a:t>a+b</a:t>
+            </a:r>
+            <a:r>
+              <a:rPr lang="en-US" altLang="zh-CN" dirty="0"/>
+              <a:t>) = cos(A)</a:t>
+            </a:r>
+            <a:r>
+              <a:rPr lang="en-US" dirty="0">
+                <a:sym typeface="Wingdings" panose="05000000000000000000" pitchFamily="2" charset="2"/>
+              </a:rPr>
+              <a:t>  </a:t>
+            </a:r>
+            <a:r>
+              <a:rPr lang="en-US" altLang="zh-CN" dirty="0"/>
+              <a:t>Cos(B) – Sin(A)</a:t>
+            </a:r>
+            <a:r>
+              <a:rPr lang="en-US" dirty="0">
+                <a:sym typeface="Wingdings" panose="05000000000000000000" pitchFamily="2" charset="2"/>
+              </a:rPr>
+              <a:t>  </a:t>
+            </a:r>
+            <a:r>
+              <a:rPr lang="en-US" altLang="zh-CN" dirty="0"/>
+              <a:t>Sin(B)</a:t>
+            </a:r>
+            <a:endParaRPr lang="en-US" dirty="0"/>
+          </a:p>
+        </p:txBody>
+      </p:sp>
+      <p:pic>
+        <p:nvPicPr>
+          <p:cNvPr id="10" name="Content Placeholder 9">
+            <a:extLst>
+              <a:ext uri="{FF2B5EF4-FFF2-40B4-BE49-F238E27FC236}">
+                <a16:creationId xmlns:a16="http://schemas.microsoft.com/office/drawing/2014/main" id="{E47ABAF6-6C7A-9B4E-8FA4-A13B52D66C35}"/>
+              </a:ext>
+            </a:extLst>
+          </p:cNvPr>
+          <p:cNvPicPr>
+            <a:picLocks noGrp="1" noChangeAspect="1"/>
+          </p:cNvPicPr>
+          <p:nvPr>
+            <p:ph sz="half" idx="1"/>
+          </p:nvPr>
+        </p:nvPicPr>
+        <p:blipFill>
+          <a:blip r:embed="rId2"/>
+          <a:stretch>
+            <a:fillRect/>
+          </a:stretch>
+        </p:blipFill>
         <p:spPr>
           <a:xfrm>
-            <a:off x="568031" y="3536903"/>
-            <a:ext cx="5196272" cy="1576276"/>
+            <a:off x="933253" y="2488358"/>
+            <a:ext cx="4191810" cy="3098784"/>
           </a:xfrm>
         </p:spPr>
-        <p:txBody>
-          <a:bodyPr vert="horz" lIns="91440" tIns="45720" rIns="91440" bIns="45720" rtlCol="0" anchor="b">
-            <a:normAutofit/>
-          </a:bodyPr>
-          <a:lstStyle/>
-          <a:p>
-            <a:r>
-              <a:rPr lang="en-US" sz="4400" dirty="0">
-                <a:solidFill>
-                  <a:srgbClr val="FFFFFF"/>
-                </a:solidFill>
-              </a:rPr>
-              <a:t>Processing </a:t>
-            </a:r>
-            <a:br>
-              <a:rPr lang="en-US" sz="4400" dirty="0">
-                <a:solidFill>
-                  <a:srgbClr val="FFFFFF"/>
-                </a:solidFill>
-              </a:rPr>
-            </a:br>
-            <a:r>
-              <a:rPr lang="zh-CN" altLang="en-US" sz="4400" dirty="0">
-                <a:solidFill>
-                  <a:srgbClr val="FFFFFF"/>
-                </a:solidFill>
-              </a:rPr>
-              <a:t>点 </a:t>
-            </a:r>
-            <a:r>
-              <a:rPr lang="en-US" altLang="zh-CN" sz="4400" dirty="0">
-                <a:solidFill>
-                  <a:srgbClr val="FFFFFF"/>
-                </a:solidFill>
-              </a:rPr>
-              <a:t>Point</a:t>
-            </a:r>
-            <a:endParaRPr lang="en-US" sz="4400" dirty="0">
-              <a:solidFill>
-                <a:srgbClr val="FFFFFF"/>
-              </a:solidFill>
-            </a:endParaRPr>
-          </a:p>
-        </p:txBody>
-      </p:sp>
+      </p:pic>
       <p:sp>
         <p:nvSpPr>
-          <p:cNvPr id="6" name="Text Placeholder 5">
+          <p:cNvPr id="8" name="Content Placeholder 7">
             <a:extLst>
               <a:ext uri="{FF2B5EF4-FFF2-40B4-BE49-F238E27FC236}">
-                <a16:creationId xmlns:a16="http://schemas.microsoft.com/office/drawing/2014/main" id="{0948C32B-C854-A931-D9ED-1A29A8A882CA}"/>
+                <a16:creationId xmlns:a16="http://schemas.microsoft.com/office/drawing/2014/main" id="{F3229864-1ECE-3539-6BA1-76E42C0591B3}"/>
               </a:ext>
             </a:extLst>
           </p:cNvPr>
@@ -18176,209 +19235,111 @@
             <a:spLocks noGrp="1"/>
           </p:cNvSpPr>
           <p:nvPr>
-            <p:ph type="body" idx="1"/>
+            <p:ph sz="half" idx="2"/>
           </p:nvPr>
         </p:nvSpPr>
-        <p:spPr>
-          <a:xfrm>
-            <a:off x="29384" y="5805023"/>
-            <a:ext cx="6259035" cy="435206"/>
-          </a:xfrm>
-        </p:spPr>
+        <p:spPr/>
         <p:txBody>
-          <a:bodyPr vert="horz" lIns="91440" tIns="45720" rIns="91440" bIns="45720" rtlCol="0" anchor="t">
-            <a:normAutofit fontScale="92500" lnSpcReduction="20000"/>
-          </a:bodyPr>
+          <a:bodyPr/>
           <a:lstStyle/>
           <a:p>
-            <a:pPr algn="r"/>
-            <a:r>
-              <a:rPr lang="en-US" sz="1800" b="1" dirty="0">
-                <a:hlinkClick r:id="rId2"/>
+            <a:pPr marL="0" indent="0">
+              <a:buNone/>
+            </a:pPr>
+            <a:r>
+              <a:rPr lang="en-US" dirty="0"/>
+              <a:t>cos(</a:t>
+            </a:r>
+            <a:r>
+              <a:rPr lang="en-US" dirty="0" err="1"/>
+              <a:t>a+b</a:t>
+            </a:r>
+            <a:r>
+              <a:rPr lang="en-US" dirty="0"/>
+              <a:t>)</a:t>
+            </a:r>
+          </a:p>
+          <a:p>
+            <a:pPr marL="0" indent="0">
+              <a:buNone/>
+            </a:pPr>
+            <a:r>
+              <a:rPr lang="en-US" dirty="0"/>
+              <a:t>= OQ / OP</a:t>
+            </a:r>
+          </a:p>
+          <a:p>
+            <a:pPr marL="0" indent="0">
+              <a:buNone/>
+            </a:pPr>
+            <a:r>
+              <a:rPr lang="en-US" dirty="0"/>
+              <a:t>= (OS – QS) / OP</a:t>
+            </a:r>
+          </a:p>
+          <a:p>
+            <a:pPr marL="0" indent="0">
+              <a:buNone/>
+            </a:pPr>
+            <a:r>
+              <a:rPr lang="en-US" dirty="0"/>
+              <a:t>= OS / OP – QS / OP</a:t>
+            </a:r>
+          </a:p>
+          <a:p>
+            <a:pPr marL="0" indent="0">
+              <a:buNone/>
+            </a:pPr>
+            <a:r>
+              <a:rPr lang="en-US" dirty="0"/>
+              <a:t>= OS / OP – TR / OP</a:t>
+            </a:r>
+          </a:p>
+          <a:p>
+            <a:pPr marL="0" indent="0">
+              <a:buNone/>
+            </a:pPr>
+            <a:r>
+              <a:rPr lang="en-US" dirty="0"/>
+              <a:t>= OS/OR </a:t>
+            </a:r>
+            <a:r>
+              <a:rPr lang="en-US" dirty="0">
+                <a:sym typeface="Wingdings" panose="05000000000000000000" pitchFamily="2" charset="2"/>
               </a:rPr>
-              <a:t>https://github.com/yasenstar/Processing_Programming</a:t>
-            </a:r>
-            <a:endParaRPr lang="en-US" sz="1800" b="1" dirty="0">
-              <a:solidFill>
-                <a:srgbClr val="FFFFFF"/>
-              </a:solidFill>
-            </a:endParaRPr>
-          </a:p>
-          <a:p>
-            <a:pPr algn="r"/>
-            <a:endParaRPr lang="en-US" sz="1800" b="1" dirty="0"/>
-          </a:p>
-        </p:txBody>
-      </p:sp>
-      <p:pic>
-        <p:nvPicPr>
-          <p:cNvPr id="4" name="Picture 3">
-            <a:extLst>
-              <a:ext uri="{FF2B5EF4-FFF2-40B4-BE49-F238E27FC236}">
-                <a16:creationId xmlns:a16="http://schemas.microsoft.com/office/drawing/2014/main" id="{2BB64D50-2612-E1AB-3582-3EC0F25781DD}"/>
-              </a:ext>
-            </a:extLst>
-          </p:cNvPr>
-          <p:cNvPicPr>
-            <a:picLocks noChangeAspect="1"/>
-          </p:cNvPicPr>
-          <p:nvPr/>
-        </p:nvPicPr>
-        <p:blipFill>
-          <a:blip r:embed="rId3"/>
-          <a:stretch>
-            <a:fillRect/>
-          </a:stretch>
-        </p:blipFill>
-        <p:spPr>
-          <a:xfrm>
-            <a:off x="550343" y="302887"/>
-            <a:ext cx="2445296" cy="3054381"/>
-          </a:xfrm>
-          <a:prstGeom prst="rect">
-            <a:avLst/>
-          </a:prstGeom>
-          <a:solidFill>
-            <a:srgbClr val="FFFFFF">
-              <a:shade val="85000"/>
-            </a:srgbClr>
-          </a:solidFill>
-        </p:spPr>
-      </p:pic>
-      <p:sp>
-        <p:nvSpPr>
-          <p:cNvPr id="7" name="TextBox 6">
-            <a:extLst>
-              <a:ext uri="{FF2B5EF4-FFF2-40B4-BE49-F238E27FC236}">
-                <a16:creationId xmlns:a16="http://schemas.microsoft.com/office/drawing/2014/main" id="{EC30F526-AE41-E2C2-352A-037BA5C2D2A9}"/>
-              </a:ext>
-            </a:extLst>
-          </p:cNvPr>
-          <p:cNvSpPr txBox="1"/>
-          <p:nvPr/>
-        </p:nvSpPr>
-        <p:spPr>
-          <a:xfrm>
-            <a:off x="3029200" y="306246"/>
-            <a:ext cx="1742785" cy="1323439"/>
-          </a:xfrm>
-          <a:prstGeom prst="rect">
-            <a:avLst/>
-          </a:prstGeom>
-          <a:noFill/>
-        </p:spPr>
-        <p:txBody>
-          <a:bodyPr wrap="none" rtlCol="0">
-            <a:spAutoFit/>
-          </a:bodyPr>
-          <a:lstStyle/>
-          <a:p>
-            <a:pPr algn="ctr"/>
-            <a:r>
-              <a:rPr lang="en-US" sz="8000" dirty="0"/>
-              <a:t>009</a:t>
-            </a:r>
-          </a:p>
-        </p:txBody>
-      </p:sp>
-      <p:pic>
-        <p:nvPicPr>
-          <p:cNvPr id="3" name="Picture 2">
-            <a:extLst>
-              <a:ext uri="{FF2B5EF4-FFF2-40B4-BE49-F238E27FC236}">
-                <a16:creationId xmlns:a16="http://schemas.microsoft.com/office/drawing/2014/main" id="{F51AD2B4-29E3-7290-D683-AA319D5A6BD7}"/>
-              </a:ext>
-            </a:extLst>
-          </p:cNvPr>
-          <p:cNvPicPr>
-            <a:picLocks noChangeAspect="1"/>
-          </p:cNvPicPr>
-          <p:nvPr/>
-        </p:nvPicPr>
-        <p:blipFill>
-          <a:blip r:embed="rId4"/>
-          <a:stretch>
-            <a:fillRect/>
-          </a:stretch>
-        </p:blipFill>
-        <p:spPr>
-          <a:xfrm>
-            <a:off x="4063627" y="1528062"/>
-            <a:ext cx="7652403" cy="3801875"/>
-          </a:xfrm>
-          <a:prstGeom prst="rect">
-            <a:avLst/>
-          </a:prstGeom>
-          <a:ln>
-            <a:noFill/>
-          </a:ln>
-          <a:effectLst>
-            <a:outerShdw blurRad="292100" dist="139700" dir="2700000" algn="tl" rotWithShape="0">
-              <a:srgbClr val="333333">
-                <a:alpha val="65000"/>
-              </a:srgbClr>
-            </a:outerShdw>
-          </a:effectLst>
-        </p:spPr>
-      </p:pic>
-      <p:sp>
-        <p:nvSpPr>
-          <p:cNvPr id="8" name="Rectangle: Rounded Corners 7">
-            <a:extLst>
-              <a:ext uri="{FF2B5EF4-FFF2-40B4-BE49-F238E27FC236}">
-                <a16:creationId xmlns:a16="http://schemas.microsoft.com/office/drawing/2014/main" id="{2C0EB603-92E7-8307-088A-9CF94AE03B89}"/>
-              </a:ext>
-            </a:extLst>
-          </p:cNvPr>
-          <p:cNvSpPr/>
-          <p:nvPr/>
-        </p:nvSpPr>
-        <p:spPr>
-          <a:xfrm>
-            <a:off x="6536554" y="4463143"/>
-            <a:ext cx="5109877" cy="650036"/>
-          </a:xfrm>
-          <a:prstGeom prst="roundRect">
-            <a:avLst>
-              <a:gd name="adj" fmla="val 6410"/>
-            </a:avLst>
-          </a:prstGeom>
-          <a:noFill/>
-          <a:ln w="57150">
-            <a:solidFill>
-              <a:schemeClr val="accent1"/>
-            </a:solidFill>
-          </a:ln>
-        </p:spPr>
-        <p:style>
-          <a:lnRef idx="2">
-            <a:schemeClr val="accent1">
-              <a:shade val="15000"/>
-            </a:schemeClr>
-          </a:lnRef>
-          <a:fillRef idx="1">
-            <a:schemeClr val="accent1"/>
-          </a:fillRef>
-          <a:effectRef idx="0">
-            <a:schemeClr val="accent1"/>
-          </a:effectRef>
-          <a:fontRef idx="minor">
-            <a:schemeClr val="lt1"/>
-          </a:fontRef>
-        </p:style>
-        <p:txBody>
-          <a:bodyPr rtlCol="0" anchor="ctr"/>
-          <a:lstStyle/>
-          <a:p>
-            <a:pPr algn="ctr"/>
-            <a:endParaRPr lang="en-US"/>
+              <a:t> OR/OP - TR/PR  PR/OP</a:t>
+            </a:r>
+          </a:p>
+          <a:p>
+            <a:pPr marL="0" indent="0">
+              <a:buNone/>
+            </a:pPr>
+            <a:r>
+              <a:rPr lang="en-US" dirty="0">
+                <a:sym typeface="Wingdings" panose="05000000000000000000" pitchFamily="2" charset="2"/>
+              </a:rPr>
+              <a:t>= </a:t>
+            </a:r>
+            <a:r>
+              <a:rPr lang="en-US" altLang="zh-CN" dirty="0">
+                <a:sym typeface="Wingdings" panose="05000000000000000000" pitchFamily="2" charset="2"/>
+              </a:rPr>
+              <a:t>cos</a:t>
+            </a:r>
+            <a:r>
+              <a:rPr lang="en-US" dirty="0">
+                <a:sym typeface="Wingdings" panose="05000000000000000000" pitchFamily="2" charset="2"/>
+              </a:rPr>
+              <a:t>(a)  cos(b) - sin(a)  sin(b)</a:t>
+            </a:r>
+            <a:endParaRPr lang="en-US" dirty="0"/>
           </a:p>
         </p:txBody>
       </p:sp>
     </p:spTree>
     <p:extLst>
       <p:ext uri="{BB962C8B-B14F-4D97-AF65-F5344CB8AC3E}">
-        <p14:creationId xmlns:p14="http://schemas.microsoft.com/office/powerpoint/2010/main" val="2718071313"/>
+        <p14:creationId xmlns:p14="http://schemas.microsoft.com/office/powerpoint/2010/main" val="1684409642"/>
       </p:ext>
     </p:extLst>
   </p:cSld>

</xml_diff>